<commit_message>
Added presentation on Debugging, plus updates of other materials
Added new exercise OOP.1.6a (RolePlayV12)
</commit_message>
<xml_diff>
--- a/CSharpProgramming/Presentations/ProgPartII/ConditionalStatements.pptx
+++ b/CSharpProgramming/Presentations/ProgPartII/ConditionalStatements.pptx
@@ -277,7 +277,7 @@
           <a:p>
             <a:fld id="{E15B7D8E-2A20-4C0E-991C-872DBB7459A8}" type="datetimeFigureOut">
               <a:rPr lang="da-DK" smtClean="0"/>
-              <a:t>02-10-2017</a:t>
+              <a:t>24-02-2018</a:t>
             </a:fld>
             <a:endParaRPr lang="da-DK"/>
           </a:p>
@@ -447,7 +447,7 @@
           <a:p>
             <a:fld id="{E15B7D8E-2A20-4C0E-991C-872DBB7459A8}" type="datetimeFigureOut">
               <a:rPr lang="da-DK" smtClean="0"/>
-              <a:t>02-10-2017</a:t>
+              <a:t>24-02-2018</a:t>
             </a:fld>
             <a:endParaRPr lang="da-DK"/>
           </a:p>
@@ -627,7 +627,7 @@
           <a:p>
             <a:fld id="{E15B7D8E-2A20-4C0E-991C-872DBB7459A8}" type="datetimeFigureOut">
               <a:rPr lang="da-DK" smtClean="0"/>
-              <a:t>02-10-2017</a:t>
+              <a:t>24-02-2018</a:t>
             </a:fld>
             <a:endParaRPr lang="da-DK"/>
           </a:p>
@@ -797,7 +797,7 @@
           <a:p>
             <a:fld id="{E15B7D8E-2A20-4C0E-991C-872DBB7459A8}" type="datetimeFigureOut">
               <a:rPr lang="da-DK" smtClean="0"/>
-              <a:t>02-10-2017</a:t>
+              <a:t>24-02-2018</a:t>
             </a:fld>
             <a:endParaRPr lang="da-DK"/>
           </a:p>
@@ -1043,7 +1043,7 @@
           <a:p>
             <a:fld id="{E15B7D8E-2A20-4C0E-991C-872DBB7459A8}" type="datetimeFigureOut">
               <a:rPr lang="da-DK" smtClean="0"/>
-              <a:t>02-10-2017</a:t>
+              <a:t>24-02-2018</a:t>
             </a:fld>
             <a:endParaRPr lang="da-DK"/>
           </a:p>
@@ -1275,7 +1275,7 @@
           <a:p>
             <a:fld id="{E15B7D8E-2A20-4C0E-991C-872DBB7459A8}" type="datetimeFigureOut">
               <a:rPr lang="da-DK" smtClean="0"/>
-              <a:t>02-10-2017</a:t>
+              <a:t>24-02-2018</a:t>
             </a:fld>
             <a:endParaRPr lang="da-DK"/>
           </a:p>
@@ -1642,7 +1642,7 @@
           <a:p>
             <a:fld id="{E15B7D8E-2A20-4C0E-991C-872DBB7459A8}" type="datetimeFigureOut">
               <a:rPr lang="da-DK" smtClean="0"/>
-              <a:t>02-10-2017</a:t>
+              <a:t>24-02-2018</a:t>
             </a:fld>
             <a:endParaRPr lang="da-DK"/>
           </a:p>
@@ -1760,7 +1760,7 @@
           <a:p>
             <a:fld id="{E15B7D8E-2A20-4C0E-991C-872DBB7459A8}" type="datetimeFigureOut">
               <a:rPr lang="da-DK" smtClean="0"/>
-              <a:t>02-10-2017</a:t>
+              <a:t>24-02-2018</a:t>
             </a:fld>
             <a:endParaRPr lang="da-DK"/>
           </a:p>
@@ -1855,7 +1855,7 @@
           <a:p>
             <a:fld id="{E15B7D8E-2A20-4C0E-991C-872DBB7459A8}" type="datetimeFigureOut">
               <a:rPr lang="da-DK" smtClean="0"/>
-              <a:t>02-10-2017</a:t>
+              <a:t>24-02-2018</a:t>
             </a:fld>
             <a:endParaRPr lang="da-DK"/>
           </a:p>
@@ -2132,7 +2132,7 @@
           <a:p>
             <a:fld id="{E15B7D8E-2A20-4C0E-991C-872DBB7459A8}" type="datetimeFigureOut">
               <a:rPr lang="da-DK" smtClean="0"/>
-              <a:t>02-10-2017</a:t>
+              <a:t>24-02-2018</a:t>
             </a:fld>
             <a:endParaRPr lang="da-DK"/>
           </a:p>
@@ -2385,7 +2385,7 @@
           <a:p>
             <a:fld id="{E15B7D8E-2A20-4C0E-991C-872DBB7459A8}" type="datetimeFigureOut">
               <a:rPr lang="da-DK" smtClean="0"/>
-              <a:t>02-10-2017</a:t>
+              <a:t>24-02-2018</a:t>
             </a:fld>
             <a:endParaRPr lang="da-DK"/>
           </a:p>
@@ -2598,7 +2598,7 @@
           <a:p>
             <a:fld id="{E15B7D8E-2A20-4C0E-991C-872DBB7459A8}" type="datetimeFigureOut">
               <a:rPr lang="da-DK" smtClean="0"/>
-              <a:t>02-10-2017</a:t>
+              <a:t>24-02-2018</a:t>
             </a:fld>
             <a:endParaRPr lang="da-DK"/>
           </a:p>
@@ -3015,7 +3015,7 @@
         </p:nvSpPr>
         <p:spPr>
           <a:xfrm>
-            <a:off x="1524000" y="1122362"/>
+            <a:off x="1524000" y="1176506"/>
             <a:ext cx="9144000" cy="3144837"/>
           </a:xfrm>
         </p:spPr>
@@ -14835,9 +14835,6 @@
               </a:rPr>
               <a:t> (noOfItems &lt; 10)</a:t>
             </a:r>
-            <a:endParaRPr lang="da-DK" sz="2800" b="1" smtClean="0">
-              <a:latin typeface="Consolas" panose="020B0609020204030204" pitchFamily="49" charset="0"/>
-            </a:endParaRPr>
           </a:p>
           <a:p>
             <a:r>
@@ -14860,9 +14857,6 @@
               </a:rPr>
               <a:t>  discount = 0;</a:t>
             </a:r>
-            <a:endParaRPr lang="da-DK" sz="2800" b="1" smtClean="0">
-              <a:latin typeface="Consolas" panose="020B0609020204030204" pitchFamily="49" charset="0"/>
-            </a:endParaRPr>
           </a:p>
           <a:p>
             <a:r>
@@ -15485,13 +15479,7 @@
               <a:rPr lang="da-DK" sz="2400" b="1">
                 <a:latin typeface="Consolas" panose="020B0609020204030204" pitchFamily="49" charset="0"/>
               </a:rPr>
-              <a:t>discount = (noOfItems &lt; </a:t>
-            </a:r>
-            <a:r>
-              <a:rPr lang="da-DK" sz="2400" b="1">
-                <a:latin typeface="Consolas" panose="020B0609020204030204" pitchFamily="49" charset="0"/>
-              </a:rPr>
-              <a:t>10</a:t>
+              <a:t>discount = (noOfItems &lt; 10</a:t>
             </a:r>
             <a:r>
               <a:rPr lang="da-DK" sz="2400" b="1" smtClean="0">

</xml_diff>